<commit_message>
Documentation: Small updates in presentation
</commit_message>
<xml_diff>
--- a/Documentation/Why_SmallJS.pptx
+++ b/Documentation/Why_SmallJS.pptx
@@ -174,7 +174,7 @@
             </a:lvl1pPr>
           </a:lstStyle>
           <a:p>
-            <a:endParaRPr lang="nl-NL" dirty="0"/>
+            <a:endParaRPr lang="nl-NL"/>
           </a:p>
         </p:txBody>
       </p:sp>
@@ -207,9 +207,9 @@
           <a:p>
             <a:fld id="{7EE9B6BF-FCD1-4AFD-A293-49BDC34FBA2C}" type="datetimeFigureOut">
               <a:rPr lang="nl-NL" smtClean="0"/>
-              <a:t>14-9-2023</a:t>
+              <a:t>29-2-2024</a:t>
             </a:fld>
-            <a:endParaRPr lang="nl-NL" dirty="0"/>
+            <a:endParaRPr lang="nl-NL"/>
           </a:p>
         </p:txBody>
       </p:sp>
@@ -242,7 +242,7 @@
           <a:bodyPr vert="horz" lIns="91440" tIns="45720" rIns="91440" bIns="45720" rtlCol="0" anchor="ctr"/>
           <a:lstStyle/>
           <a:p>
-            <a:endParaRPr lang="nl-NL" dirty="0"/>
+            <a:endParaRPr lang="nl-NL"/>
           </a:p>
         </p:txBody>
       </p:sp>
@@ -333,7 +333,7 @@
             </a:lvl1pPr>
           </a:lstStyle>
           <a:p>
-            <a:endParaRPr lang="nl-NL" dirty="0"/>
+            <a:endParaRPr lang="nl-NL"/>
           </a:p>
         </p:txBody>
       </p:sp>
@@ -368,7 +368,7 @@
               <a:rPr lang="nl-NL" smtClean="0"/>
               <a:t>‹#›</a:t>
             </a:fld>
-            <a:endParaRPr lang="nl-NL" dirty="0"/>
+            <a:endParaRPr lang="nl-NL"/>
           </a:p>
         </p:txBody>
       </p:sp>
@@ -520,21 +520,21 @@
           <a:lstStyle/>
           <a:p>
             <a:r>
-              <a:rPr lang="en-US" dirty="0"/>
+              <a:rPr lang="en-US"/>
               <a:t>The colorful air balloon is of course a reference to the BYTE Magazine August </a:t>
             </a:r>
             <a:r>
-              <a:rPr lang="en-US" b="1" i="1" dirty="0"/>
+              <a:rPr lang="en-US" b="1" i="1"/>
               <a:t>1981</a:t>
             </a:r>
             <a:r>
-              <a:rPr lang="en-US" dirty="0"/>
+              <a:rPr lang="en-US"/>
               <a:t> edition about Smalltalk-80,</a:t>
             </a:r>
           </a:p>
           <a:p>
             <a:r>
-              <a:rPr lang="en-US" dirty="0"/>
+              <a:rPr lang="en-US"/>
               <a:t>as you have probably already noticed. ;-).</a:t>
             </a:r>
           </a:p>
@@ -559,7 +559,7 @@
               <a:rPr lang="nl-NL" smtClean="0"/>
               <a:t>1</a:t>
             </a:fld>
-            <a:endParaRPr lang="nl-NL" dirty="0"/>
+            <a:endParaRPr lang="nl-NL"/>
           </a:p>
         </p:txBody>
       </p:sp>
@@ -620,7 +620,7 @@
           <a:bodyPr/>
           <a:lstStyle/>
           <a:p>
-            <a:endParaRPr lang="en-US" dirty="0"/>
+            <a:endParaRPr lang="en-US"/>
           </a:p>
         </p:txBody>
       </p:sp>
@@ -643,7 +643,7 @@
               <a:rPr lang="nl-NL" smtClean="0"/>
               <a:t>11</a:t>
             </a:fld>
-            <a:endParaRPr lang="nl-NL" dirty="0"/>
+            <a:endParaRPr lang="nl-NL"/>
           </a:p>
         </p:txBody>
       </p:sp>
@@ -705,7 +705,7 @@
           <a:lstStyle/>
           <a:p>
             <a:r>
-              <a:rPr lang="en-US" dirty="0"/>
+              <a:rPr lang="en-US"/>
               <a:t>Databases: Postgres, MariaDB and MySQL.</a:t>
             </a:r>
           </a:p>
@@ -730,7 +730,7 @@
               <a:rPr lang="nl-NL" smtClean="0"/>
               <a:t>2</a:t>
             </a:fld>
-            <a:endParaRPr lang="nl-NL" dirty="0"/>
+            <a:endParaRPr lang="nl-NL"/>
           </a:p>
         </p:txBody>
       </p:sp>
@@ -792,25 +792,25 @@
           <a:lstStyle/>
           <a:p>
             <a:r>
-              <a:rPr lang="en-US" dirty="0"/>
+              <a:rPr lang="en-US"/>
               <a:t>The pop-left contains the ST base library (image).</a:t>
             </a:r>
           </a:p>
           <a:p>
             <a:r>
-              <a:rPr lang="en-US" dirty="0"/>
+              <a:rPr lang="en-US"/>
               <a:t>Below that the example shop client, in a separate project.</a:t>
             </a:r>
           </a:p>
           <a:p>
             <a:r>
-              <a:rPr lang="en-US" dirty="0"/>
+              <a:rPr lang="en-US"/>
               <a:t>ST source code on the right, methods loadOrders and onLoadOrders (part).</a:t>
             </a:r>
           </a:p>
           <a:p>
             <a:r>
-              <a:rPr lang="en-US" dirty="0"/>
+              <a:rPr lang="en-US"/>
               <a:t>Live demo possible...</a:t>
             </a:r>
           </a:p>
@@ -835,7 +835,7 @@
               <a:rPr lang="nl-NL" smtClean="0"/>
               <a:t>3</a:t>
             </a:fld>
-            <a:endParaRPr lang="nl-NL" dirty="0"/>
+            <a:endParaRPr lang="nl-NL"/>
           </a:p>
         </p:txBody>
       </p:sp>
@@ -897,7 +897,7 @@
           <a:lstStyle/>
           <a:p>
             <a:r>
-              <a:rPr lang="en-US" dirty="0"/>
+              <a:rPr lang="en-US"/>
               <a:t>So why should I use SmallJS i.s.o. TypeScript? (don’t use bare JS ;-)</a:t>
             </a:r>
           </a:p>
@@ -922,7 +922,7 @@
               <a:rPr lang="nl-NL" smtClean="0"/>
               <a:t>4</a:t>
             </a:fld>
-            <a:endParaRPr lang="nl-NL" dirty="0"/>
+            <a:endParaRPr lang="nl-NL"/>
           </a:p>
         </p:txBody>
       </p:sp>
@@ -984,13 +984,13 @@
           <a:lstStyle/>
           <a:p>
             <a:r>
-              <a:rPr lang="en-US" noProof="0" dirty="0"/>
+              <a:rPr lang="en-US" noProof="0"/>
               <a:t>That the syntax fits on a postcard is actually true.</a:t>
             </a:r>
           </a:p>
           <a:p>
             <a:r>
-              <a:rPr lang="en-US" noProof="0" dirty="0"/>
+              <a:rPr lang="en-US" noProof="0"/>
               <a:t>The quarter on the lower left contains the complete syntax.</a:t>
             </a:r>
           </a:p>
@@ -1015,7 +1015,7 @@
               <a:rPr lang="nl-NL" smtClean="0"/>
               <a:t>5</a:t>
             </a:fld>
-            <a:endParaRPr lang="nl-NL" dirty="0"/>
+            <a:endParaRPr lang="nl-NL"/>
           </a:p>
         </p:txBody>
       </p:sp>
@@ -1077,7 +1077,7 @@
           <a:lstStyle/>
           <a:p>
             <a:r>
-              <a:rPr lang="en-US" dirty="0"/>
+              <a:rPr lang="en-US"/>
               <a:t>Smalltalk advantages</a:t>
             </a:r>
           </a:p>
@@ -1087,7 +1087,7 @@
               <a:buChar char="-"/>
             </a:pPr>
             <a:r>
-              <a:rPr lang="en-US" dirty="0"/>
+              <a:rPr lang="en-US"/>
               <a:t>More elegant calling and reuse.</a:t>
             </a:r>
           </a:p>
@@ -1097,7 +1097,7 @@
               <a:buChar char="-"/>
             </a:pPr>
             <a:r>
-              <a:rPr lang="en-US" dirty="0"/>
+              <a:rPr lang="en-US"/>
               <a:t>Preserves fractions.</a:t>
             </a:r>
           </a:p>
@@ -1107,7 +1107,7 @@
               <a:buChar char="-"/>
             </a:pPr>
             <a:r>
-              <a:rPr lang="en-US" dirty="0"/>
+              <a:rPr lang="en-US"/>
               <a:t>Automatic big int use.</a:t>
             </a:r>
           </a:p>
@@ -1117,7 +1117,7 @@
               <a:buChar char="-"/>
             </a:pPr>
             <a:r>
-              <a:rPr lang="en-US" dirty="0"/>
+              <a:rPr lang="en-US"/>
               <a:t>Signals error after illegal use i.s.o. unwanted coercion.</a:t>
             </a:r>
           </a:p>
@@ -1142,7 +1142,7 @@
               <a:rPr lang="nl-NL" smtClean="0"/>
               <a:t>6</a:t>
             </a:fld>
-            <a:endParaRPr lang="nl-NL" dirty="0"/>
+            <a:endParaRPr lang="nl-NL"/>
           </a:p>
         </p:txBody>
       </p:sp>
@@ -1204,13 +1204,13 @@
           <a:lstStyle/>
           <a:p>
             <a:r>
-              <a:rPr lang="en-US" dirty="0"/>
+              <a:rPr lang="en-US"/>
               <a:t>For async / wait it is not possible to work around it with a simpler concurrency method: block fork.</a:t>
             </a:r>
           </a:p>
           <a:p>
             <a:r>
-              <a:rPr lang="en-US" dirty="0"/>
+              <a:rPr lang="en-US"/>
               <a:t>The basic design fix is that the *caller* should decide async execution, not the *callee*.</a:t>
             </a:r>
           </a:p>
@@ -1235,7 +1235,7 @@
               <a:rPr lang="nl-NL" smtClean="0"/>
               <a:t>7</a:t>
             </a:fld>
-            <a:endParaRPr lang="nl-NL" dirty="0"/>
+            <a:endParaRPr lang="nl-NL"/>
           </a:p>
         </p:txBody>
       </p:sp>
@@ -1297,23 +1297,23 @@
           <a:lstStyle/>
           <a:p>
             <a:r>
-              <a:rPr lang="en-US" dirty="0"/>
+              <a:rPr lang="en-US"/>
               <a:t>Type inferencing via VSCode IDE needs language server.</a:t>
             </a:r>
           </a:p>
           <a:p>
             <a:r>
-              <a:rPr lang="en-US" dirty="0"/>
+              <a:rPr lang="en-US"/>
               <a:t>Dolphin Smalltalk implemented namespaces recently.</a:t>
             </a:r>
           </a:p>
           <a:p>
             <a:r>
-              <a:rPr lang="en-US" dirty="0"/>
+              <a:rPr lang="en-US"/>
               <a:t>Community: That’s what you guys could help with. </a:t>
             </a:r>
             <a:r>
-              <a:rPr lang="en-US" dirty="0">
+              <a:rPr lang="en-US">
                 <a:sym typeface="Wingdings" panose="05000000000000000000" pitchFamily="2" charset="2"/>
               </a:rPr>
               <a:t></a:t>
@@ -1321,15 +1321,15 @@
           </a:p>
           <a:p>
             <a:r>
-              <a:rPr lang="en-US" dirty="0">
+              <a:rPr lang="en-US">
                 <a:sym typeface="Wingdings" panose="05000000000000000000" pitchFamily="2" charset="2"/>
               </a:rPr>
               <a:t>And you can use SmallJS incrementally next to TS.</a:t>
             </a:r>
-            <a:endParaRPr lang="en-US" dirty="0"/>
-          </a:p>
-          <a:p>
-            <a:endParaRPr lang="en-US" dirty="0"/>
+            <a:endParaRPr lang="en-US"/>
+          </a:p>
+          <a:p>
+            <a:endParaRPr lang="en-US"/>
           </a:p>
         </p:txBody>
       </p:sp>
@@ -1352,7 +1352,7 @@
               <a:rPr lang="nl-NL" smtClean="0"/>
               <a:t>9</a:t>
             </a:fld>
-            <a:endParaRPr lang="nl-NL" dirty="0"/>
+            <a:endParaRPr lang="nl-NL"/>
           </a:p>
         </p:txBody>
       </p:sp>
@@ -1413,7 +1413,7 @@
           <a:bodyPr/>
           <a:lstStyle/>
           <a:p>
-            <a:endParaRPr lang="en-US" dirty="0"/>
+            <a:endParaRPr lang="en-US"/>
           </a:p>
         </p:txBody>
       </p:sp>
@@ -1436,7 +1436,7 @@
               <a:rPr lang="nl-NL" smtClean="0"/>
               <a:t>10</a:t>
             </a:fld>
-            <a:endParaRPr lang="nl-NL" dirty="0"/>
+            <a:endParaRPr lang="nl-NL"/>
           </a:p>
         </p:txBody>
       </p:sp>
@@ -2198,9 +2198,9 @@
           <a:p>
             <a:fld id="{4D9E9568-0F03-4866-87AD-CAF9FA4FA032}" type="datetimeFigureOut">
               <a:rPr lang="nl-NL" smtClean="0"/>
-              <a:t>14-9-2023</a:t>
+              <a:t>29-2-2024</a:t>
             </a:fld>
-            <a:endParaRPr lang="nl-NL" dirty="0"/>
+            <a:endParaRPr lang="nl-NL"/>
           </a:p>
         </p:txBody>
       </p:sp>
@@ -2219,7 +2219,7 @@
           <a:bodyPr/>
           <a:lstStyle/>
           <a:p>
-            <a:endParaRPr lang="nl-NL" dirty="0"/>
+            <a:endParaRPr lang="nl-NL"/>
           </a:p>
         </p:txBody>
       </p:sp>
@@ -2242,7 +2242,7 @@
               <a:rPr lang="nl-NL" smtClean="0"/>
               <a:t>‹#›</a:t>
             </a:fld>
-            <a:endParaRPr lang="nl-NL" dirty="0"/>
+            <a:endParaRPr lang="nl-NL"/>
           </a:p>
         </p:txBody>
       </p:sp>
@@ -2449,9 +2449,9 @@
           <a:p>
             <a:fld id="{4D9E9568-0F03-4866-87AD-CAF9FA4FA032}" type="datetimeFigureOut">
               <a:rPr lang="nl-NL" smtClean="0"/>
-              <a:t>14-9-2023</a:t>
+              <a:t>29-2-2024</a:t>
             </a:fld>
-            <a:endParaRPr lang="nl-NL" dirty="0"/>
+            <a:endParaRPr lang="nl-NL"/>
           </a:p>
         </p:txBody>
       </p:sp>
@@ -2470,7 +2470,7 @@
           <a:bodyPr/>
           <a:lstStyle/>
           <a:p>
-            <a:endParaRPr lang="nl-NL" dirty="0"/>
+            <a:endParaRPr lang="nl-NL"/>
           </a:p>
         </p:txBody>
       </p:sp>
@@ -2493,7 +2493,7 @@
               <a:rPr lang="nl-NL" smtClean="0"/>
               <a:t>‹#›</a:t>
             </a:fld>
-            <a:endParaRPr lang="nl-NL" dirty="0"/>
+            <a:endParaRPr lang="nl-NL"/>
           </a:p>
         </p:txBody>
       </p:sp>
@@ -2763,9 +2763,9 @@
           <a:p>
             <a:fld id="{4D9E9568-0F03-4866-87AD-CAF9FA4FA032}" type="datetimeFigureOut">
               <a:rPr lang="nl-NL" smtClean="0"/>
-              <a:t>14-9-2023</a:t>
+              <a:t>29-2-2024</a:t>
             </a:fld>
-            <a:endParaRPr lang="nl-NL" dirty="0"/>
+            <a:endParaRPr lang="nl-NL"/>
           </a:p>
         </p:txBody>
       </p:sp>
@@ -2784,7 +2784,7 @@
           <a:bodyPr/>
           <a:lstStyle/>
           <a:p>
-            <a:endParaRPr lang="nl-NL" dirty="0"/>
+            <a:endParaRPr lang="nl-NL"/>
           </a:p>
         </p:txBody>
       </p:sp>
@@ -2807,7 +2807,7 @@
               <a:rPr lang="nl-NL" smtClean="0"/>
               <a:t>‹#›</a:t>
             </a:fld>
-            <a:endParaRPr lang="nl-NL" dirty="0"/>
+            <a:endParaRPr lang="nl-NL"/>
           </a:p>
         </p:txBody>
       </p:sp>
@@ -2834,7 +2834,7 @@
           <a:p>
             <a:pPr lvl="0"/>
             <a:r>
-              <a:rPr lang="en-US" sz="8000" baseline="0" dirty="0">
+              <a:rPr lang="en-US" sz="8000" baseline="0">
                 <a:ln w="3175" cmpd="sng">
                   <a:noFill/>
                 </a:ln>
@@ -2875,7 +2875,7 @@
           <a:p>
             <a:pPr lvl="0"/>
             <a:r>
-              <a:rPr lang="en-US" sz="8000" baseline="0" dirty="0">
+              <a:rPr lang="en-US" sz="8000" baseline="0">
                 <a:ln w="3175" cmpd="sng">
                   <a:noFill/>
                 </a:ln>
@@ -3096,9 +3096,9 @@
           <a:p>
             <a:fld id="{4D9E9568-0F03-4866-87AD-CAF9FA4FA032}" type="datetimeFigureOut">
               <a:rPr lang="nl-NL" smtClean="0"/>
-              <a:t>14-9-2023</a:t>
+              <a:t>29-2-2024</a:t>
             </a:fld>
-            <a:endParaRPr lang="nl-NL" dirty="0"/>
+            <a:endParaRPr lang="nl-NL"/>
           </a:p>
         </p:txBody>
       </p:sp>
@@ -3117,7 +3117,7 @@
           <a:bodyPr/>
           <a:lstStyle/>
           <a:p>
-            <a:endParaRPr lang="nl-NL" dirty="0"/>
+            <a:endParaRPr lang="nl-NL"/>
           </a:p>
         </p:txBody>
       </p:sp>
@@ -3140,7 +3140,7 @@
               <a:rPr lang="nl-NL" smtClean="0"/>
               <a:t>‹#›</a:t>
             </a:fld>
-            <a:endParaRPr lang="nl-NL" dirty="0"/>
+            <a:endParaRPr lang="nl-NL"/>
           </a:p>
         </p:txBody>
       </p:sp>
@@ -3410,9 +3410,9 @@
           <a:p>
             <a:fld id="{4D9E9568-0F03-4866-87AD-CAF9FA4FA032}" type="datetimeFigureOut">
               <a:rPr lang="nl-NL" smtClean="0"/>
-              <a:t>14-9-2023</a:t>
+              <a:t>29-2-2024</a:t>
             </a:fld>
-            <a:endParaRPr lang="nl-NL" dirty="0"/>
+            <a:endParaRPr lang="nl-NL"/>
           </a:p>
         </p:txBody>
       </p:sp>
@@ -3431,7 +3431,7 @@
           <a:bodyPr/>
           <a:lstStyle/>
           <a:p>
-            <a:endParaRPr lang="nl-NL" dirty="0"/>
+            <a:endParaRPr lang="nl-NL"/>
           </a:p>
         </p:txBody>
       </p:sp>
@@ -3454,7 +3454,7 @@
               <a:rPr lang="nl-NL" smtClean="0"/>
               <a:t>‹#›</a:t>
             </a:fld>
-            <a:endParaRPr lang="nl-NL" dirty="0"/>
+            <a:endParaRPr lang="nl-NL"/>
           </a:p>
         </p:txBody>
       </p:sp>
@@ -3481,7 +3481,7 @@
           <a:p>
             <a:pPr lvl="0"/>
             <a:r>
-              <a:rPr lang="en-US" sz="8000" baseline="0" dirty="0">
+              <a:rPr lang="en-US" sz="8000" baseline="0">
                 <a:ln w="3175" cmpd="sng">
                   <a:noFill/>
                 </a:ln>
@@ -3522,7 +3522,7 @@
           <a:p>
             <a:pPr lvl="0"/>
             <a:r>
-              <a:rPr lang="en-US" sz="8000" baseline="0" dirty="0">
+              <a:rPr lang="en-US" sz="8000" baseline="0">
                 <a:ln w="3175" cmpd="sng">
                   <a:noFill/>
                 </a:ln>
@@ -3803,9 +3803,9 @@
           <a:p>
             <a:fld id="{4D9E9568-0F03-4866-87AD-CAF9FA4FA032}" type="datetimeFigureOut">
               <a:rPr lang="nl-NL" smtClean="0"/>
-              <a:t>14-9-2023</a:t>
+              <a:t>29-2-2024</a:t>
             </a:fld>
-            <a:endParaRPr lang="nl-NL" dirty="0"/>
+            <a:endParaRPr lang="nl-NL"/>
           </a:p>
         </p:txBody>
       </p:sp>
@@ -3824,7 +3824,7 @@
           <a:bodyPr/>
           <a:lstStyle/>
           <a:p>
-            <a:endParaRPr lang="nl-NL" dirty="0"/>
+            <a:endParaRPr lang="nl-NL"/>
           </a:p>
         </p:txBody>
       </p:sp>
@@ -3847,7 +3847,7 @@
               <a:rPr lang="nl-NL" smtClean="0"/>
               <a:t>‹#›</a:t>
             </a:fld>
-            <a:endParaRPr lang="nl-NL" dirty="0"/>
+            <a:endParaRPr lang="nl-NL"/>
           </a:p>
         </p:txBody>
       </p:sp>
@@ -3973,9 +3973,9 @@
           <a:p>
             <a:fld id="{4D9E9568-0F03-4866-87AD-CAF9FA4FA032}" type="datetimeFigureOut">
               <a:rPr lang="nl-NL" smtClean="0"/>
-              <a:t>14-9-2023</a:t>
+              <a:t>29-2-2024</a:t>
             </a:fld>
-            <a:endParaRPr lang="nl-NL" dirty="0"/>
+            <a:endParaRPr lang="nl-NL"/>
           </a:p>
         </p:txBody>
       </p:sp>
@@ -3994,7 +3994,7 @@
           <a:bodyPr/>
           <a:lstStyle/>
           <a:p>
-            <a:endParaRPr lang="nl-NL" dirty="0"/>
+            <a:endParaRPr lang="nl-NL"/>
           </a:p>
         </p:txBody>
       </p:sp>
@@ -4017,7 +4017,7 @@
               <a:rPr lang="nl-NL" smtClean="0"/>
               <a:t>‹#›</a:t>
             </a:fld>
-            <a:endParaRPr lang="nl-NL" dirty="0"/>
+            <a:endParaRPr lang="nl-NL"/>
           </a:p>
         </p:txBody>
       </p:sp>
@@ -4153,9 +4153,9 @@
           <a:p>
             <a:fld id="{4D9E9568-0F03-4866-87AD-CAF9FA4FA032}" type="datetimeFigureOut">
               <a:rPr lang="nl-NL" smtClean="0"/>
-              <a:t>14-9-2023</a:t>
+              <a:t>29-2-2024</a:t>
             </a:fld>
-            <a:endParaRPr lang="nl-NL" dirty="0"/>
+            <a:endParaRPr lang="nl-NL"/>
           </a:p>
         </p:txBody>
       </p:sp>
@@ -4174,7 +4174,7 @@
           <a:bodyPr/>
           <a:lstStyle/>
           <a:p>
-            <a:endParaRPr lang="nl-NL" dirty="0"/>
+            <a:endParaRPr lang="nl-NL"/>
           </a:p>
         </p:txBody>
       </p:sp>
@@ -4197,7 +4197,7 @@
               <a:rPr lang="nl-NL" smtClean="0"/>
               <a:t>‹#›</a:t>
             </a:fld>
-            <a:endParaRPr lang="nl-NL" dirty="0"/>
+            <a:endParaRPr lang="nl-NL"/>
           </a:p>
         </p:txBody>
       </p:sp>
@@ -4323,9 +4323,9 @@
           <a:p>
             <a:fld id="{4D9E9568-0F03-4866-87AD-CAF9FA4FA032}" type="datetimeFigureOut">
               <a:rPr lang="nl-NL" smtClean="0"/>
-              <a:t>14-9-2023</a:t>
+              <a:t>29-2-2024</a:t>
             </a:fld>
-            <a:endParaRPr lang="nl-NL" dirty="0"/>
+            <a:endParaRPr lang="nl-NL"/>
           </a:p>
         </p:txBody>
       </p:sp>
@@ -4344,7 +4344,7 @@
           <a:bodyPr/>
           <a:lstStyle/>
           <a:p>
-            <a:endParaRPr lang="nl-NL" dirty="0"/>
+            <a:endParaRPr lang="nl-NL"/>
           </a:p>
         </p:txBody>
       </p:sp>
@@ -4367,7 +4367,7 @@
               <a:rPr lang="nl-NL" smtClean="0"/>
               <a:t>‹#›</a:t>
             </a:fld>
-            <a:endParaRPr lang="nl-NL" dirty="0"/>
+            <a:endParaRPr lang="nl-NL"/>
           </a:p>
         </p:txBody>
       </p:sp>
@@ -4570,9 +4570,9 @@
           <a:p>
             <a:fld id="{4D9E9568-0F03-4866-87AD-CAF9FA4FA032}" type="datetimeFigureOut">
               <a:rPr lang="nl-NL" smtClean="0"/>
-              <a:t>14-9-2023</a:t>
+              <a:t>29-2-2024</a:t>
             </a:fld>
-            <a:endParaRPr lang="nl-NL" dirty="0"/>
+            <a:endParaRPr lang="nl-NL"/>
           </a:p>
         </p:txBody>
       </p:sp>
@@ -4591,7 +4591,7 @@
           <a:bodyPr/>
           <a:lstStyle/>
           <a:p>
-            <a:endParaRPr lang="nl-NL" dirty="0"/>
+            <a:endParaRPr lang="nl-NL"/>
           </a:p>
         </p:txBody>
       </p:sp>
@@ -4614,7 +4614,7 @@
               <a:rPr lang="nl-NL" smtClean="0"/>
               <a:t>‹#›</a:t>
             </a:fld>
-            <a:endParaRPr lang="nl-NL" dirty="0"/>
+            <a:endParaRPr lang="nl-NL"/>
           </a:p>
         </p:txBody>
       </p:sp>
@@ -4802,9 +4802,9 @@
           <a:p>
             <a:fld id="{4D9E9568-0F03-4866-87AD-CAF9FA4FA032}" type="datetimeFigureOut">
               <a:rPr lang="nl-NL" smtClean="0"/>
-              <a:t>14-9-2023</a:t>
+              <a:t>29-2-2024</a:t>
             </a:fld>
-            <a:endParaRPr lang="nl-NL" dirty="0"/>
+            <a:endParaRPr lang="nl-NL"/>
           </a:p>
         </p:txBody>
       </p:sp>
@@ -4823,7 +4823,7 @@
           <a:bodyPr/>
           <a:lstStyle/>
           <a:p>
-            <a:endParaRPr lang="nl-NL" dirty="0"/>
+            <a:endParaRPr lang="nl-NL"/>
           </a:p>
         </p:txBody>
       </p:sp>
@@ -4846,7 +4846,7 @@
               <a:rPr lang="nl-NL" smtClean="0"/>
               <a:t>‹#›</a:t>
             </a:fld>
-            <a:endParaRPr lang="nl-NL" dirty="0"/>
+            <a:endParaRPr lang="nl-NL"/>
           </a:p>
         </p:txBody>
       </p:sp>
@@ -5176,9 +5176,9 @@
           <a:p>
             <a:fld id="{4D9E9568-0F03-4866-87AD-CAF9FA4FA032}" type="datetimeFigureOut">
               <a:rPr lang="nl-NL" smtClean="0"/>
-              <a:t>14-9-2023</a:t>
+              <a:t>29-2-2024</a:t>
             </a:fld>
-            <a:endParaRPr lang="nl-NL" dirty="0"/>
+            <a:endParaRPr lang="nl-NL"/>
           </a:p>
         </p:txBody>
       </p:sp>
@@ -5197,7 +5197,7 @@
           <a:bodyPr/>
           <a:lstStyle/>
           <a:p>
-            <a:endParaRPr lang="nl-NL" dirty="0"/>
+            <a:endParaRPr lang="nl-NL"/>
           </a:p>
         </p:txBody>
       </p:sp>
@@ -5220,7 +5220,7 @@
               <a:rPr lang="nl-NL" smtClean="0"/>
               <a:t>‹#›</a:t>
             </a:fld>
-            <a:endParaRPr lang="nl-NL" dirty="0"/>
+            <a:endParaRPr lang="nl-NL"/>
           </a:p>
         </p:txBody>
       </p:sp>
@@ -5299,9 +5299,9 @@
           <a:p>
             <a:fld id="{4D9E9568-0F03-4866-87AD-CAF9FA4FA032}" type="datetimeFigureOut">
               <a:rPr lang="nl-NL" smtClean="0"/>
-              <a:t>14-9-2023</a:t>
+              <a:t>29-2-2024</a:t>
             </a:fld>
-            <a:endParaRPr lang="nl-NL" dirty="0"/>
+            <a:endParaRPr lang="nl-NL"/>
           </a:p>
         </p:txBody>
       </p:sp>
@@ -5320,7 +5320,7 @@
           <a:bodyPr/>
           <a:lstStyle/>
           <a:p>
-            <a:endParaRPr lang="nl-NL" dirty="0"/>
+            <a:endParaRPr lang="nl-NL"/>
           </a:p>
         </p:txBody>
       </p:sp>
@@ -5343,7 +5343,7 @@
               <a:rPr lang="nl-NL" smtClean="0"/>
               <a:t>‹#›</a:t>
             </a:fld>
-            <a:endParaRPr lang="nl-NL" dirty="0"/>
+            <a:endParaRPr lang="nl-NL"/>
           </a:p>
         </p:txBody>
       </p:sp>
@@ -5394,9 +5394,9 @@
           <a:p>
             <a:fld id="{4D9E9568-0F03-4866-87AD-CAF9FA4FA032}" type="datetimeFigureOut">
               <a:rPr lang="nl-NL" smtClean="0"/>
-              <a:t>14-9-2023</a:t>
+              <a:t>29-2-2024</a:t>
             </a:fld>
-            <a:endParaRPr lang="nl-NL" dirty="0"/>
+            <a:endParaRPr lang="nl-NL"/>
           </a:p>
         </p:txBody>
       </p:sp>
@@ -5415,7 +5415,7 @@
           <a:bodyPr/>
           <a:lstStyle/>
           <a:p>
-            <a:endParaRPr lang="nl-NL" dirty="0"/>
+            <a:endParaRPr lang="nl-NL"/>
           </a:p>
         </p:txBody>
       </p:sp>
@@ -5438,7 +5438,7 @@
               <a:rPr lang="nl-NL" smtClean="0"/>
               <a:t>‹#›</a:t>
             </a:fld>
-            <a:endParaRPr lang="nl-NL" dirty="0"/>
+            <a:endParaRPr lang="nl-NL"/>
           </a:p>
         </p:txBody>
       </p:sp>
@@ -5649,9 +5649,9 @@
           <a:p>
             <a:fld id="{4D9E9568-0F03-4866-87AD-CAF9FA4FA032}" type="datetimeFigureOut">
               <a:rPr lang="nl-NL" smtClean="0"/>
-              <a:t>14-9-2023</a:t>
+              <a:t>29-2-2024</a:t>
             </a:fld>
-            <a:endParaRPr lang="nl-NL" dirty="0"/>
+            <a:endParaRPr lang="nl-NL"/>
           </a:p>
         </p:txBody>
       </p:sp>
@@ -5670,7 +5670,7 @@
           <a:bodyPr/>
           <a:lstStyle/>
           <a:p>
-            <a:endParaRPr lang="nl-NL" dirty="0"/>
+            <a:endParaRPr lang="nl-NL"/>
           </a:p>
         </p:txBody>
       </p:sp>
@@ -5693,7 +5693,7 @@
               <a:rPr lang="nl-NL" smtClean="0"/>
               <a:t>‹#›</a:t>
             </a:fld>
-            <a:endParaRPr lang="nl-NL" dirty="0"/>
+            <a:endParaRPr lang="nl-NL"/>
           </a:p>
         </p:txBody>
       </p:sp>
@@ -5821,7 +5821,7 @@
           </a:lstStyle>
           <a:p>
             <a:r>
-              <a:rPr lang="en-US" dirty="0"/>
+              <a:rPr lang="en-US"/>
               <a:t>Click icon to add picture</a:t>
             </a:r>
           </a:p>
@@ -5909,7 +5909,7 @@
           <a:bodyPr/>
           <a:lstStyle/>
           <a:p>
-            <a:endParaRPr lang="nl-NL" dirty="0"/>
+            <a:endParaRPr lang="nl-NL"/>
           </a:p>
         </p:txBody>
       </p:sp>
@@ -5932,7 +5932,7 @@
               <a:rPr lang="nl-NL" smtClean="0"/>
               <a:t>‹#›</a:t>
             </a:fld>
-            <a:endParaRPr lang="nl-NL" dirty="0"/>
+            <a:endParaRPr lang="nl-NL"/>
           </a:p>
         </p:txBody>
       </p:sp>
@@ -5953,9 +5953,9 @@
           <a:p>
             <a:fld id="{4D9E9568-0F03-4866-87AD-CAF9FA4FA032}" type="datetimeFigureOut">
               <a:rPr lang="nl-NL" smtClean="0"/>
-              <a:t>14-9-2023</a:t>
+              <a:t>29-2-2024</a:t>
             </a:fld>
-            <a:endParaRPr lang="nl-NL" dirty="0"/>
+            <a:endParaRPr lang="nl-NL"/>
           </a:p>
         </p:txBody>
       </p:sp>
@@ -6655,9 +6655,9 @@
           <a:p>
             <a:fld id="{4D9E9568-0F03-4866-87AD-CAF9FA4FA032}" type="datetimeFigureOut">
               <a:rPr lang="nl-NL" smtClean="0"/>
-              <a:t>14-9-2023</a:t>
+              <a:t>29-2-2024</a:t>
             </a:fld>
-            <a:endParaRPr lang="nl-NL" dirty="0"/>
+            <a:endParaRPr lang="nl-NL"/>
           </a:p>
         </p:txBody>
       </p:sp>
@@ -6694,7 +6694,7 @@
             </a:lvl1pPr>
           </a:lstStyle>
           <a:p>
-            <a:endParaRPr lang="nl-NL" dirty="0"/>
+            <a:endParaRPr lang="nl-NL"/>
           </a:p>
         </p:txBody>
       </p:sp>
@@ -6733,7 +6733,7 @@
               <a:rPr lang="nl-NL" smtClean="0"/>
               <a:t>‹#›</a:t>
             </a:fld>
-            <a:endParaRPr lang="nl-NL" dirty="0"/>
+            <a:endParaRPr lang="nl-NL"/>
           </a:p>
         </p:txBody>
       </p:sp>
@@ -7225,7 +7225,7 @@
               <a:defRPr/>
             </a:pPr>
             <a:r>
-              <a:rPr lang="en-US" sz="7200" cap="none" dirty="0">
+              <a:rPr lang="en-US" sz="7200" cap="none">
                 <a:solidFill>
                   <a:srgbClr val="0070C0"/>
                 </a:solidFill>
@@ -7233,14 +7233,14 @@
               <a:t>SmallJS</a:t>
             </a:r>
             <a:br>
-              <a:rPr lang="en-US" cap="none" dirty="0">
+              <a:rPr lang="en-US" cap="none">
                 <a:solidFill>
                   <a:srgbClr val="0070C0"/>
                 </a:solidFill>
               </a:rPr>
             </a:br>
             <a:r>
-              <a:rPr kumimoji="0" lang="en-US" sz="2400" b="0" i="0" u="none" strike="noStrike" kern="1200" cap="none" spc="0" normalizeH="0" baseline="0" noProof="0" dirty="0">
+              <a:rPr kumimoji="0" lang="en-US" sz="2400" b="0" i="0" u="none" strike="noStrike" kern="1200" cap="none" spc="0" normalizeH="0" baseline="0" noProof="0">
                 <a:ln>
                   <a:noFill/>
                 </a:ln>
@@ -7259,7 +7259,7 @@
               </a:rPr>
               <a:t>Back to elegance</a:t>
             </a:r>
-            <a:endParaRPr lang="en-US" sz="2400" cap="none" dirty="0">
+            <a:endParaRPr lang="en-US" sz="2400" cap="none">
               <a:solidFill>
                 <a:srgbClr val="0070C0"/>
               </a:solidFill>
@@ -7332,16 +7332,8 @@
           <a:lstStyle/>
           <a:p>
             <a:r>
-              <a:rPr lang="nl-NL" dirty="0"/>
-              <a:t>Open </a:t>
-            </a:r>
-            <a:r>
-              <a:rPr lang="nl-NL" dirty="0" err="1"/>
-              <a:t>sourced</a:t>
-            </a:r>
-            <a:r>
-              <a:rPr lang="nl-NL" dirty="0"/>
-              <a:t> on: github.com/Small-JS/SmallJS</a:t>
+              <a:rPr lang="nl-NL"/>
+              <a:t>Open sourced on: github.com/Small-JS/SmallJS</a:t>
             </a:r>
           </a:p>
         </p:txBody>
@@ -7404,14 +7396,14 @@
           <a:p>
             <a:pPr algn="ctr"/>
             <a:r>
-              <a:rPr lang="en-US" dirty="0">
+              <a:rPr lang="en-US">
                 <a:solidFill>
                   <a:srgbClr val="0070C0"/>
                 </a:solidFill>
               </a:rPr>
               <a:t>SmallJS summary</a:t>
             </a:r>
-            <a:endParaRPr lang="nl-NL" dirty="0">
+            <a:endParaRPr lang="nl-NL">
               <a:solidFill>
                 <a:srgbClr val="0070C0"/>
               </a:solidFill>
@@ -7446,31 +7438,31 @@
           <a:lstStyle/>
           <a:p>
             <a:r>
-              <a:rPr lang="en-US" sz="2400" b="1" dirty="0"/>
+              <a:rPr lang="en-US" sz="2400" b="1"/>
               <a:t>Uses the elegant and safe Smalltalk language!</a:t>
             </a:r>
           </a:p>
           <a:p>
             <a:r>
-              <a:rPr lang="en-US" sz="2400" dirty="0"/>
+              <a:rPr lang="en-US" sz="2400"/>
               <a:t>Integrates tightly with JS.</a:t>
             </a:r>
           </a:p>
           <a:p>
             <a:r>
-              <a:rPr lang="en-US" sz="2400" dirty="0"/>
+              <a:rPr lang="en-US" sz="2400"/>
               <a:t>Familiar JS class and method names.</a:t>
             </a:r>
           </a:p>
           <a:p>
             <a:r>
-              <a:rPr lang="en-US" sz="2400" dirty="0"/>
+              <a:rPr lang="en-US" sz="2400"/>
               <a:t>Use with your favorite IDE.</a:t>
             </a:r>
           </a:p>
           <a:p>
             <a:r>
-              <a:rPr lang="en-US" sz="2400" dirty="0"/>
+              <a:rPr lang="en-US" sz="2400"/>
               <a:t>Incremental use possible, mix and match.</a:t>
             </a:r>
           </a:p>
@@ -7534,14 +7526,14 @@
           <a:p>
             <a:pPr algn="ctr"/>
             <a:r>
-              <a:rPr lang="en-US" dirty="0">
+              <a:rPr lang="en-US">
                 <a:solidFill>
                   <a:srgbClr val="0070C0"/>
                 </a:solidFill>
               </a:rPr>
               <a:t>Any questions?</a:t>
             </a:r>
-            <a:endParaRPr lang="nl-NL" dirty="0">
+            <a:endParaRPr lang="nl-NL">
               <a:solidFill>
                 <a:srgbClr val="0070C0"/>
               </a:solidFill>
@@ -7645,7 +7637,7 @@
           <a:p>
             <a:pPr algn="ctr"/>
             <a:r>
-              <a:rPr lang="nl-NL" sz="2400" dirty="0"/>
+              <a:rPr lang="nl-NL" sz="2400"/>
               <a:t>github.com/Small-JS/SmallJS</a:t>
             </a:r>
           </a:p>
@@ -7709,14 +7701,14 @@
           <a:p>
             <a:pPr algn="ctr"/>
             <a:r>
-              <a:rPr lang="en-US" dirty="0">
+              <a:rPr lang="en-US">
                 <a:solidFill>
                   <a:srgbClr val="0070C0"/>
                 </a:solidFill>
               </a:rPr>
               <a:t>What is SmallJS?</a:t>
             </a:r>
-            <a:endParaRPr lang="nl-NL" dirty="0">
+            <a:endParaRPr lang="nl-NL">
               <a:solidFill>
                 <a:srgbClr val="0070C0"/>
               </a:solidFill>
@@ -7753,80 +7745,80 @@
           <a:lstStyle/>
           <a:p>
             <a:r>
-              <a:rPr lang="en-US" sz="2400" dirty="0"/>
+              <a:rPr lang="en-US" sz="2400"/>
               <a:t>Transpiler from Smalltalk to efficient, lightweight JavaScript.</a:t>
             </a:r>
           </a:p>
           <a:p>
             <a:r>
-              <a:rPr lang="en-US" sz="2400" dirty="0"/>
+              <a:rPr lang="en-US" sz="2400"/>
               <a:t>JS code runs in all browsers </a:t>
             </a:r>
             <a:r>
-              <a:rPr lang="en-US" sz="2400" b="1" i="1" dirty="0"/>
+              <a:rPr lang="en-US" sz="2400" b="1" i="1"/>
               <a:t>and</a:t>
             </a:r>
             <a:r>
-              <a:rPr lang="en-US" sz="2400" dirty="0"/>
+              <a:rPr lang="en-US" sz="2400"/>
               <a:t> Node.js.</a:t>
             </a:r>
           </a:p>
           <a:p>
             <a:r>
-              <a:rPr lang="en-US" sz="2400" dirty="0"/>
+              <a:rPr lang="en-US" sz="2400"/>
               <a:t>Smalltalk-80 language syntax support</a:t>
             </a:r>
           </a:p>
           <a:p>
             <a:pPr lvl="1"/>
             <a:r>
-              <a:rPr lang="en-US" sz="2000" dirty="0"/>
+              <a:rPr lang="en-US" sz="2000"/>
               <a:t>Class and method names like familiar JS.</a:t>
             </a:r>
           </a:p>
           <a:p>
             <a:r>
-              <a:rPr lang="en-US" sz="2400" dirty="0"/>
+              <a:rPr lang="en-US" sz="2400"/>
               <a:t>Source file based (not image based).</a:t>
             </a:r>
           </a:p>
           <a:p>
             <a:r>
-              <a:rPr lang="en-US" sz="2400" dirty="0"/>
+              <a:rPr lang="en-US" sz="2400"/>
               <a:t>Development in Visual Studio Code IDE</a:t>
             </a:r>
           </a:p>
           <a:p>
             <a:pPr lvl="1"/>
             <a:r>
-              <a:rPr lang="en-US" sz="2200" dirty="0"/>
+              <a:rPr lang="en-US" sz="2200"/>
               <a:t>With syntax coloring and step debugging!</a:t>
             </a:r>
           </a:p>
           <a:p>
             <a:r>
-              <a:rPr lang="en-US" sz="2400" dirty="0"/>
+              <a:rPr lang="en-US" sz="2400"/>
               <a:t>JS libraries already encapsulated in ST:</a:t>
             </a:r>
           </a:p>
           <a:p>
             <a:pPr lvl="1"/>
             <a:r>
-              <a:rPr lang="en-US" sz="2000" dirty="0"/>
+              <a:rPr lang="en-US" sz="2000"/>
               <a:t>Browser: Document, Window, HTML elements, events, CSS, streams.</a:t>
             </a:r>
           </a:p>
           <a:p>
             <a:pPr lvl="1"/>
             <a:r>
-              <a:rPr lang="en-US" sz="2000" dirty="0"/>
+              <a:rPr lang="en-US" sz="2000"/>
               <a:t>Node.JS: HTTP server, Express, 3 databases.</a:t>
             </a:r>
           </a:p>
           <a:p>
             <a:r>
-              <a:rPr lang="en-US" sz="2200" dirty="0"/>
-              <a:t>Example webshop client + server app template.</a:t>
+              <a:rPr lang="en-US" sz="2200"/>
+              <a:t>Examples, including a webshop client + server app template.</a:t>
             </a:r>
           </a:p>
         </p:txBody>
@@ -7888,14 +7880,14 @@
           <a:lstStyle/>
           <a:p>
             <a:r>
-              <a:rPr lang="en-US" dirty="0">
+              <a:rPr lang="en-US">
                 <a:solidFill>
                   <a:srgbClr val="0070C0"/>
                 </a:solidFill>
               </a:rPr>
               <a:t>How does it look?</a:t>
             </a:r>
-            <a:endParaRPr lang="nl-NL" dirty="0">
+            <a:endParaRPr lang="nl-NL">
               <a:solidFill>
                 <a:srgbClr val="0070C0"/>
               </a:solidFill>
@@ -7924,7 +7916,7 @@
           <a:bodyPr/>
           <a:lstStyle/>
           <a:p>
-            <a:endParaRPr lang="en-US" dirty="0"/>
+            <a:endParaRPr lang="en-US"/>
           </a:p>
         </p:txBody>
       </p:sp>
@@ -8041,14 +8033,14 @@
           <a:p>
             <a:pPr algn="ctr"/>
             <a:r>
-              <a:rPr lang="en-US" dirty="0">
+              <a:rPr lang="en-US">
                 <a:solidFill>
                   <a:srgbClr val="0070C0"/>
                 </a:solidFill>
               </a:rPr>
               <a:t>Why use SmallJS?</a:t>
             </a:r>
-            <a:endParaRPr lang="nl-NL" dirty="0">
+            <a:endParaRPr lang="nl-NL">
               <a:solidFill>
                 <a:srgbClr val="0070C0"/>
               </a:solidFill>
@@ -8085,52 +8077,52 @@
           <a:lstStyle/>
           <a:p>
             <a:r>
-              <a:rPr lang="en-US" sz="2400" dirty="0"/>
+              <a:rPr lang="en-US" sz="2400"/>
               <a:t>The Smalltalk language syntax fits on a postcard</a:t>
             </a:r>
           </a:p>
           <a:p>
             <a:r>
-              <a:rPr lang="en-US" sz="2400" dirty="0"/>
+              <a:rPr lang="en-US" sz="2400"/>
               <a:t>Objects all the way down</a:t>
             </a:r>
           </a:p>
           <a:p>
             <a:pPr lvl="1"/>
             <a:r>
-              <a:rPr lang="en-US" sz="2000" dirty="0"/>
+              <a:rPr lang="en-US" sz="2000"/>
               <a:t>Customizable on every level.</a:t>
             </a:r>
             <a:br>
-              <a:rPr lang="en-US" sz="2000" dirty="0"/>
+              <a:rPr lang="en-US" sz="2000"/>
             </a:br>
             <a:r>
-              <a:rPr lang="en-US" sz="2000" dirty="0"/>
+              <a:rPr lang="en-US" sz="2000"/>
               <a:t>Need to add a complex number type? Easy.</a:t>
             </a:r>
           </a:p>
           <a:p>
             <a:r>
-              <a:rPr lang="en-US" sz="2400" dirty="0"/>
+              <a:rPr lang="en-US" sz="2400"/>
               <a:t>Well defined behaviors</a:t>
             </a:r>
           </a:p>
           <a:p>
             <a:pPr lvl="1"/>
             <a:r>
-              <a:rPr lang="en-US" sz="2000" dirty="0"/>
+              <a:rPr lang="en-US" sz="2000"/>
               <a:t>Integers are really integers. Controlled type conversions.</a:t>
             </a:r>
           </a:p>
           <a:p>
             <a:r>
-              <a:rPr lang="en-US" sz="2400" dirty="0"/>
+              <a:rPr lang="en-US" sz="2400"/>
               <a:t>Uses familiar JS names and functionality</a:t>
             </a:r>
           </a:p>
           <a:p>
             <a:r>
-              <a:rPr lang="en-US" sz="2400" dirty="0"/>
+              <a:rPr lang="en-US" sz="2400"/>
               <a:t>Easily mix and match JS libraries with ST</a:t>
             </a:r>
           </a:p>
@@ -8195,14 +8187,14 @@
           <a:lstStyle/>
           <a:p>
             <a:r>
-              <a:rPr lang="en-US" dirty="0">
+              <a:rPr lang="en-US">
                 <a:solidFill>
                   <a:srgbClr val="0070C0"/>
                 </a:solidFill>
               </a:rPr>
               <a:t>Smalltalk syntax on a postcard</a:t>
             </a:r>
-            <a:endParaRPr lang="nl-NL" dirty="0">
+            <a:endParaRPr lang="nl-NL">
               <a:solidFill>
                 <a:srgbClr val="0070C0"/>
               </a:solidFill>
@@ -8307,8 +8299,8 @@
         </p:nvSpPr>
         <p:spPr>
           <a:xfrm>
-            <a:off x="889001" y="1940103"/>
-            <a:ext cx="4563532" cy="4167186"/>
+            <a:off x="699912" y="1940103"/>
+            <a:ext cx="4752621" cy="4167186"/>
           </a:xfrm>
         </p:spPr>
         <p:txBody>
@@ -8318,13 +8310,16 @@
           <a:lstStyle/>
           <a:p>
             <a:pPr marL="0" indent="0">
-              <a:lnSpc>
-                <a:spcPct val="110000"/>
-              </a:lnSpc>
+              <a:spcBef>
+                <a:spcPts val="0"/>
+              </a:spcBef>
+              <a:spcAft>
+                <a:spcPts val="900"/>
+              </a:spcAft>
               <a:buNone/>
             </a:pPr>
             <a:r>
-              <a:rPr lang="en-US" sz="1400" noProof="1">
+              <a:rPr lang="en-US" sz="1300" noProof="1">
                 <a:solidFill>
                   <a:schemeClr val="tx1"/>
                 </a:solidFill>
@@ -8335,13 +8330,16 @@
           </a:p>
           <a:p>
             <a:pPr indent="0">
-              <a:lnSpc>
-                <a:spcPct val="110000"/>
-              </a:lnSpc>
+              <a:spcBef>
+                <a:spcPts val="0"/>
+              </a:spcBef>
+              <a:spcAft>
+                <a:spcPts val="900"/>
+              </a:spcAft>
               <a:buNone/>
             </a:pPr>
             <a:r>
-              <a:rPr lang="en-US" sz="1400" noProof="1">
+              <a:rPr lang="en-US" sz="1300" noProof="1">
                 <a:solidFill>
                   <a:srgbClr val="0070C0"/>
                 </a:solidFill>
@@ -8350,7 +8348,7 @@
               <a:t>squared</a:t>
             </a:r>
             <a:br>
-              <a:rPr lang="en-US" sz="1400" noProof="1">
+              <a:rPr lang="en-US" sz="1300" noProof="1">
                 <a:solidFill>
                   <a:srgbClr val="0070C0"/>
                 </a:solidFill>
@@ -8358,7 +8356,7 @@
               </a:rPr>
             </a:br>
             <a:r>
-              <a:rPr lang="en-US" sz="1400" b="0" noProof="1">
+              <a:rPr lang="en-US" sz="1300" b="0" noProof="1">
                 <a:solidFill>
                   <a:srgbClr val="0070C0"/>
                 </a:solidFill>
@@ -8367,23 +8365,19 @@
               </a:rPr>
               <a:t>  ^ self * self.</a:t>
             </a:r>
-            <a:endParaRPr lang="en-US" sz="1400" b="0" noProof="1">
-              <a:solidFill>
-                <a:srgbClr val="CCCCCC"/>
-              </a:solidFill>
-              <a:effectLst/>
-              <a:latin typeface="Consolas" panose="020B0609020204030204" pitchFamily="49" charset="0"/>
-            </a:endParaRPr>
           </a:p>
           <a:p>
             <a:pPr marL="0" lvl="1" indent="0">
-              <a:lnSpc>
-                <a:spcPct val="110000"/>
-              </a:lnSpc>
+              <a:spcBef>
+                <a:spcPts val="0"/>
+              </a:spcBef>
+              <a:spcAft>
+                <a:spcPts val="900"/>
+              </a:spcAft>
               <a:buNone/>
             </a:pPr>
             <a:r>
-              <a:rPr lang="en-US" sz="1400" noProof="1">
+              <a:rPr lang="en-US" sz="1300" noProof="1">
                 <a:solidFill>
                   <a:schemeClr val="tx1"/>
                 </a:solidFill>
@@ -8394,16 +8388,19 @@
           </a:p>
           <a:p>
             <a:pPr marL="457200" lvl="1" indent="0">
-              <a:lnSpc>
-                <a:spcPct val="110000"/>
-              </a:lnSpc>
+              <a:spcBef>
+                <a:spcPts val="0"/>
+              </a:spcBef>
+              <a:spcAft>
+                <a:spcPts val="900"/>
+              </a:spcAft>
               <a:buNone/>
               <a:tabLst>
                 <a:tab pos="685800" algn="l"/>
               </a:tabLst>
             </a:pPr>
             <a:r>
-              <a:rPr lang="en-US" sz="1400" noProof="1">
+              <a:rPr lang="en-US" sz="1300" noProof="1">
                 <a:solidFill>
                   <a:srgbClr val="0070C0"/>
                 </a:solidFill>
@@ -8412,7 +8409,7 @@
               <a:t>10 squared     </a:t>
             </a:r>
             <a:r>
-              <a:rPr lang="en-US" sz="1400" noProof="1">
+              <a:rPr lang="en-US" sz="1300" noProof="1">
                 <a:latin typeface="Consolas" panose="020B0609020204030204" pitchFamily="49" charset="0"/>
               </a:rPr>
               <a:t>	&gt; 100</a:t>
@@ -8420,16 +8417,19 @@
           </a:p>
           <a:p>
             <a:pPr marL="457200" lvl="1" indent="0">
-              <a:lnSpc>
-                <a:spcPct val="110000"/>
-              </a:lnSpc>
+              <a:spcBef>
+                <a:spcPts val="0"/>
+              </a:spcBef>
+              <a:spcAft>
+                <a:spcPts val="900"/>
+              </a:spcAft>
               <a:buNone/>
               <a:tabLst>
                 <a:tab pos="685800" algn="l"/>
               </a:tabLst>
             </a:pPr>
             <a:r>
-              <a:rPr lang="en-US" sz="1400" noProof="1">
+              <a:rPr lang="en-US" sz="1300" noProof="1">
                 <a:solidFill>
                   <a:srgbClr val="0070C0"/>
                 </a:solidFill>
@@ -8438,7 +8438,7 @@
               <a:t>1.5 squared    </a:t>
             </a:r>
             <a:r>
-              <a:rPr lang="en-US" sz="1400" noProof="1">
+              <a:rPr lang="en-US" sz="1300" noProof="1">
                 <a:latin typeface="Consolas" panose="020B0609020204030204" pitchFamily="49" charset="0"/>
               </a:rPr>
               <a:t>	&gt; 2.25</a:t>
@@ -8446,16 +8446,19 @@
           </a:p>
           <a:p>
             <a:pPr marL="457200" lvl="1" indent="0">
-              <a:lnSpc>
-                <a:spcPct val="110000"/>
-              </a:lnSpc>
+              <a:spcBef>
+                <a:spcPts val="0"/>
+              </a:spcBef>
+              <a:spcAft>
+                <a:spcPts val="900"/>
+              </a:spcAft>
               <a:buNone/>
               <a:tabLst>
                 <a:tab pos="685800" algn="l"/>
               </a:tabLst>
             </a:pPr>
             <a:r>
-              <a:rPr lang="en-US" sz="1400" noProof="1">
+              <a:rPr lang="en-US" sz="1300" noProof="1">
                 <a:solidFill>
                   <a:srgbClr val="0070C0"/>
                 </a:solidFill>
@@ -8464,7 +8467,7 @@
               <a:t>( 1 / 3 ) squared</a:t>
             </a:r>
             <a:r>
-              <a:rPr lang="en-US" sz="1400" noProof="1">
+              <a:rPr lang="en-US" sz="1300" noProof="1">
                 <a:latin typeface="Consolas" panose="020B0609020204030204" pitchFamily="49" charset="0"/>
               </a:rPr>
               <a:t>	&gt; ( 1 / 9 )</a:t>
@@ -8472,16 +8475,19 @@
           </a:p>
           <a:p>
             <a:pPr marL="457200" lvl="1" indent="0">
-              <a:lnSpc>
-                <a:spcPct val="110000"/>
-              </a:lnSpc>
+              <a:spcBef>
+                <a:spcPts val="0"/>
+              </a:spcBef>
+              <a:spcAft>
+                <a:spcPts val="900"/>
+              </a:spcAft>
               <a:buNone/>
               <a:tabLst>
                 <a:tab pos="685800" algn="l"/>
               </a:tabLst>
             </a:pPr>
             <a:r>
-              <a:rPr lang="en-US" sz="1400" noProof="1">
+              <a:rPr lang="en-US" sz="1300" noProof="1">
                 <a:solidFill>
                   <a:srgbClr val="0070C0"/>
                 </a:solidFill>
@@ -8490,7 +8496,7 @@
               <a:t>99999999 squared </a:t>
             </a:r>
             <a:r>
-              <a:rPr lang="en-US" sz="1400" noProof="1">
+              <a:rPr lang="en-US" sz="1300" noProof="1">
                 <a:latin typeface="Consolas" panose="020B0609020204030204" pitchFamily="49" charset="0"/>
               </a:rPr>
               <a:t>	&gt; right answer, BigInt</a:t>
@@ -8498,16 +8504,19 @@
           </a:p>
           <a:p>
             <a:pPr marL="457200" lvl="1" indent="0">
-              <a:lnSpc>
-                <a:spcPct val="110000"/>
-              </a:lnSpc>
+              <a:spcBef>
+                <a:spcPts val="0"/>
+              </a:spcBef>
+              <a:spcAft>
+                <a:spcPts val="900"/>
+              </a:spcAft>
               <a:buNone/>
               <a:tabLst>
                 <a:tab pos="685800" algn="l"/>
               </a:tabLst>
             </a:pPr>
             <a:r>
-              <a:rPr lang="en-US" sz="1400" noProof="1">
+              <a:rPr lang="en-US" sz="1300" noProof="1">
                 <a:solidFill>
                   <a:srgbClr val="0070C0"/>
                 </a:solidFill>
@@ -8516,7 +8525,7 @@
               <a:t>‘s’ squared</a:t>
             </a:r>
             <a:r>
-              <a:rPr lang="en-US" sz="1400" noProof="1">
+              <a:rPr lang="en-US" sz="1300" noProof="1">
                 <a:latin typeface="Consolas" panose="020B0609020204030204" pitchFamily="49" charset="0"/>
               </a:rPr>
               <a:t>		&gt; error, stops</a:t>
@@ -8524,19 +8533,22 @@
           </a:p>
           <a:p>
             <a:pPr marL="0" indent="0">
-              <a:lnSpc>
-                <a:spcPct val="110000"/>
-              </a:lnSpc>
+              <a:spcBef>
+                <a:spcPts val="900"/>
+              </a:spcBef>
+              <a:spcAft>
+                <a:spcPts val="900"/>
+              </a:spcAft>
               <a:buNone/>
             </a:pPr>
             <a:r>
-              <a:rPr lang="en-US" sz="1400" dirty="0">
+              <a:rPr lang="en-US" sz="1300">
                 <a:solidFill>
                   <a:schemeClr val="tx1"/>
                 </a:solidFill>
                 <a:latin typeface="Consolas" panose="020B0609020204030204" pitchFamily="49" charset="0"/>
               </a:rPr>
-              <a:t>Number is a base class for Integer, Float, Fraction and BigInt, but not String.</a:t>
+              <a:t>&gt; Number is a base class for Integer, Float, Fraction and BigInt, but not String.</a:t>
             </a:r>
           </a:p>
         </p:txBody>
@@ -8649,7 +8661,7 @@
             </a:lvl9pPr>
           </a:lstStyle>
           <a:p>
-            <a:endParaRPr lang="nl-NL" dirty="0">
+            <a:endParaRPr lang="nl-NL">
               <a:solidFill>
                 <a:srgbClr val="0070C0"/>
               </a:solidFill>
@@ -9191,26 +9203,6 @@
                 <a:tab pos="685800" algn="l"/>
               </a:tabLst>
             </a:pPr>
-            <a:endParaRPr lang="en-US" sz="1300" noProof="1">
-              <a:solidFill>
-                <a:schemeClr val="tx1"/>
-              </a:solidFill>
-              <a:latin typeface="Consolas" panose="020B0609020204030204" pitchFamily="49" charset="0"/>
-            </a:endParaRPr>
-          </a:p>
-          <a:p>
-            <a:pPr marL="0" lvl="1" indent="0">
-              <a:spcBef>
-                <a:spcPts val="0"/>
-              </a:spcBef>
-              <a:spcAft>
-                <a:spcPts val="900"/>
-              </a:spcAft>
-              <a:buNone/>
-              <a:tabLst>
-                <a:tab pos="685800" algn="l"/>
-              </a:tabLst>
-            </a:pPr>
             <a:r>
               <a:rPr lang="en-US" sz="1300" noProof="1">
                 <a:solidFill>
@@ -9218,7 +9210,7 @@
                 </a:solidFill>
                 <a:latin typeface="Consolas" panose="020B0609020204030204" pitchFamily="49" charset="0"/>
               </a:rPr>
-              <a:t>No fractions, BigInt not integrated, </a:t>
+              <a:t>&gt; No (safe) integers, no fractions, BigInt not integrated, </a:t>
             </a:r>
             <a:br>
               <a:rPr lang="en-US" sz="1300" noProof="1">
@@ -9235,14 +9227,14 @@
                 </a:solidFill>
                 <a:latin typeface="Consolas" panose="020B0609020204030204" pitchFamily="49" charset="0"/>
               </a:rPr>
-              <a:t>unsafe type coersion.</a:t>
-            </a:r>
-            <a:endParaRPr lang="en-US" sz="1400" dirty="0">
+              <a:t>error prone type coersion.</a:t>
+            </a:r>
+            <a:endParaRPr lang="en-US" sz="1400">
               <a:latin typeface="Consolas" panose="020B0609020204030204" pitchFamily="49" charset="0"/>
             </a:endParaRPr>
           </a:p>
           <a:p>
-            <a:endParaRPr lang="nl-NL" sz="1400" dirty="0">
+            <a:endParaRPr lang="nl-NL" sz="1400">
               <a:solidFill>
                 <a:srgbClr val="CCCCCC"/>
               </a:solidFill>
@@ -9251,10 +9243,10 @@
           </a:p>
           <a:p>
             <a:pPr lvl="1"/>
-            <a:endParaRPr lang="en-US" sz="1400" dirty="0"/>
-          </a:p>
-          <a:p>
-            <a:endParaRPr lang="nl-NL" dirty="0"/>
+            <a:endParaRPr lang="en-US" sz="1400"/>
+          </a:p>
+          <a:p>
+            <a:endParaRPr lang="nl-NL"/>
           </a:p>
         </p:txBody>
       </p:sp>
@@ -9290,14 +9282,14 @@
               </a:spcAft>
             </a:pPr>
             <a:r>
-              <a:rPr lang="en-US" dirty="0">
+              <a:rPr lang="en-US">
                 <a:solidFill>
                   <a:srgbClr val="0070C0"/>
                 </a:solidFill>
               </a:rPr>
               <a:t>Example ST vs JS</a:t>
             </a:r>
-            <a:endParaRPr lang="nl-NL" sz="2800" dirty="0">
+            <a:endParaRPr lang="nl-NL" sz="2800">
               <a:solidFill>
                 <a:srgbClr val="0070C0"/>
               </a:solidFill>
@@ -9414,14 +9406,14 @@
               </a:tabLst>
             </a:pPr>
             <a:r>
-              <a:rPr lang="en-US" sz="2800" dirty="0">
+              <a:rPr lang="en-US" sz="2800">
                 <a:solidFill>
                   <a:srgbClr val="0070C0"/>
                 </a:solidFill>
               </a:rPr>
               <a:t>SmallJS	JavaScript</a:t>
             </a:r>
-            <a:endParaRPr lang="nl-NL" sz="2800" dirty="0">
+            <a:endParaRPr lang="nl-NL" sz="2800">
               <a:solidFill>
                 <a:srgbClr val="0070C0"/>
               </a:solidFill>
@@ -9491,14 +9483,14 @@
               </a:spcAft>
             </a:pPr>
             <a:r>
-              <a:rPr lang="en-US" dirty="0">
+              <a:rPr lang="en-US">
                 <a:solidFill>
                   <a:srgbClr val="0070C0"/>
                 </a:solidFill>
               </a:rPr>
               <a:t>What about my new JS/TS features?</a:t>
             </a:r>
-            <a:endParaRPr lang="nl-NL" sz="2800" dirty="0">
+            <a:endParaRPr lang="nl-NL" sz="2800">
               <a:solidFill>
                 <a:srgbClr val="0070C0"/>
               </a:solidFill>
@@ -9521,14 +9513,14 @@
           <p:nvPr>
             <p:extLst>
               <p:ext uri="{D42A27DB-BD31-4B8C-83A1-F6EECF244321}">
-                <p14:modId xmlns:p14="http://schemas.microsoft.com/office/powerpoint/2010/main" val="1222206810"/>
+                <p14:modId xmlns:p14="http://schemas.microsoft.com/office/powerpoint/2010/main" val="2228130788"/>
               </p:ext>
             </p:extLst>
           </p:nvPr>
         </p:nvGraphicFramePr>
         <p:xfrm>
           <a:off x="699912" y="1644906"/>
-          <a:ext cx="7202310" cy="4358640"/>
+          <a:ext cx="7202310" cy="4023360"/>
         </p:xfrm>
         <a:graphic>
           <a:graphicData uri="http://schemas.openxmlformats.org/drawingml/2006/table">
@@ -9559,7 +9551,7 @@
                     <a:lstStyle/>
                     <a:p>
                       <a:r>
-                        <a:rPr lang="en-US" sz="1600" dirty="0"/>
+                        <a:rPr lang="en-US" sz="1600"/>
                         <a:t>Feature</a:t>
                       </a:r>
                     </a:p>
@@ -9572,7 +9564,7 @@
                     <a:lstStyle/>
                     <a:p>
                       <a:r>
-                        <a:rPr lang="en-US" sz="1600" dirty="0"/>
+                        <a:rPr lang="en-US" sz="1600"/>
                         <a:t>ST solution</a:t>
                       </a:r>
                     </a:p>
@@ -9592,8 +9584,8 @@
                     <a:lstStyle/>
                     <a:p>
                       <a:r>
-                        <a:rPr lang="en-US" sz="1600" dirty="0"/>
-                        <a:t>functional approach</a:t>
+                        <a:rPr lang="en-US" sz="1600"/>
+                        <a:t>functional programming</a:t>
                       </a:r>
                     </a:p>
                   </a:txBody>
@@ -9605,8 +9597,8 @@
                     <a:lstStyle/>
                     <a:p>
                       <a:r>
-                        <a:rPr lang="en-US" sz="1600" dirty="0"/>
-                        <a:t>Don't use state vars. Array iterators.</a:t>
+                        <a:rPr lang="en-US" sz="1600"/>
+                        <a:t>Don't use state vars. Use array iterators.</a:t>
                       </a:r>
                     </a:p>
                   </a:txBody>
@@ -9625,7 +9617,7 @@
                     <a:lstStyle/>
                     <a:p>
                       <a:r>
-                        <a:rPr lang="en-US" sz="1600" dirty="0"/>
+                        <a:rPr lang="en-US" sz="1600"/>
                         <a:t>interface</a:t>
                       </a:r>
                     </a:p>
@@ -9638,8 +9630,8 @@
                     <a:lstStyle/>
                     <a:p>
                       <a:r>
-                        <a:rPr lang="en-US" sz="1600" dirty="0"/>
-                        <a:t>Abstract base class.</a:t>
+                        <a:rPr lang="en-US" sz="1600"/>
+                        <a:t>Abstract base class</a:t>
                       </a:r>
                     </a:p>
                   </a:txBody>
@@ -9658,8 +9650,8 @@
                     <a:lstStyle/>
                     <a:p>
                       <a:r>
-                        <a:rPr lang="en-US" sz="1600" dirty="0"/>
-                        <a:t>record</a:t>
+                        <a:rPr lang="en-US" sz="1600"/>
+                        <a:t>Record, tuple</a:t>
                       </a:r>
                     </a:p>
                   </a:txBody>
@@ -9671,8 +9663,8 @@
                     <a:lstStyle/>
                     <a:p>
                       <a:r>
-                        <a:rPr lang="en-US" sz="1600" dirty="0"/>
-                        <a:t>Class with only getters.</a:t>
+                        <a:rPr lang="en-US" sz="1600"/>
+                        <a:t>Class with only getters</a:t>
                       </a:r>
                     </a:p>
                   </a:txBody>
@@ -9691,7 +9683,7 @@
                     <a:lstStyle/>
                     <a:p>
                       <a:r>
-                        <a:rPr lang="en-US" sz="1600" dirty="0"/>
+                        <a:rPr lang="en-US" sz="1600"/>
                         <a:t>decorator</a:t>
                       </a:r>
                     </a:p>
@@ -9704,8 +9696,8 @@
                     <a:lstStyle/>
                     <a:p>
                       <a:r>
-                        <a:rPr lang="en-US" sz="1600" dirty="0"/>
-                        <a:t>Pass function (block)</a:t>
+                        <a:rPr lang="en-US" sz="1600"/>
+                        <a:t>Pass anonymous function (block)</a:t>
                       </a:r>
                     </a:p>
                   </a:txBody>
@@ -9724,7 +9716,7 @@
                     <a:lstStyle/>
                     <a:p>
                       <a:r>
-                        <a:rPr lang="en-US" sz="1600" dirty="0"/>
+                        <a:rPr lang="en-US" sz="1600"/>
                         <a:t>static</a:t>
                       </a:r>
                     </a:p>
@@ -9737,7 +9729,7 @@
                     <a:lstStyle/>
                     <a:p>
                       <a:r>
-                        <a:rPr lang="en-US" sz="1600" dirty="0"/>
+                        <a:rPr lang="en-US" sz="1600"/>
                         <a:t>Class method</a:t>
                       </a:r>
                     </a:p>
@@ -9757,7 +9749,7 @@
                     <a:lstStyle/>
                     <a:p>
                       <a:r>
-                        <a:rPr lang="en-US" sz="1600" dirty="0"/>
+                        <a:rPr lang="en-US" sz="1600"/>
                         <a:t>private</a:t>
                       </a:r>
                     </a:p>
@@ -9770,7 +9762,7 @@
                     <a:lstStyle/>
                     <a:p>
                       <a:r>
-                        <a:rPr lang="en-US" sz="1600" dirty="0"/>
+                        <a:rPr lang="en-US" sz="1600"/>
                         <a:t>No getter method</a:t>
                       </a:r>
                     </a:p>
@@ -9790,7 +9782,7 @@
                     <a:lstStyle/>
                     <a:p>
                       <a:r>
-                        <a:rPr lang="en-US" sz="1600" dirty="0"/>
+                        <a:rPr lang="en-US" sz="1600"/>
                         <a:t>variable argument list</a:t>
                       </a:r>
                     </a:p>
@@ -9803,7 +9795,7 @@
                     <a:lstStyle/>
                     <a:p>
                       <a:r>
-                        <a:rPr lang="en-US" sz="1600" dirty="0"/>
+                        <a:rPr lang="en-US" sz="1600"/>
                         <a:t>Array</a:t>
                       </a:r>
                     </a:p>
@@ -9823,40 +9815,7 @@
                     <a:lstStyle/>
                     <a:p>
                       <a:r>
-                        <a:rPr lang="en-US" sz="1600" dirty="0"/>
-                        <a:t>tuple</a:t>
-                      </a:r>
-                    </a:p>
-                  </a:txBody>
-                  <a:tcPr/>
-                </a:tc>
-                <a:tc>
-                  <a:txBody>
-                    <a:bodyPr/>
-                    <a:lstStyle/>
-                    <a:p>
-                      <a:r>
-                        <a:rPr lang="en-US" sz="1600" dirty="0"/>
-                        <a:t>Class</a:t>
-                      </a:r>
-                    </a:p>
-                  </a:txBody>
-                  <a:tcPr/>
-                </a:tc>
-                <a:extLst>
-                  <a:ext uri="{0D108BD9-81ED-4DB2-BD59-A6C34878D82A}">
-                    <a16:rowId xmlns:a16="http://schemas.microsoft.com/office/drawing/2014/main" val="978215940"/>
-                  </a:ext>
-                </a:extLst>
-              </a:tr>
-              <a:tr h="0">
-                <a:tc>
-                  <a:txBody>
-                    <a:bodyPr/>
-                    <a:lstStyle/>
-                    <a:p>
-                      <a:r>
-                        <a:rPr lang="en-US" sz="1600" dirty="0"/>
+                        <a:rPr lang="en-US" sz="1600"/>
                         <a:t>optional argument</a:t>
                       </a:r>
                     </a:p>
@@ -9869,8 +9828,8 @@
                     <a:lstStyle/>
                     <a:p>
                       <a:r>
-                        <a:rPr lang="en-US" sz="1600" dirty="0"/>
-                        <a:t>Extra 1-line method.</a:t>
+                        <a:rPr lang="en-US" sz="1600"/>
+                        <a:t>Extra 1-line method</a:t>
                       </a:r>
                     </a:p>
                   </a:txBody>
@@ -9889,7 +9848,7 @@
                     <a:lstStyle/>
                     <a:p>
                       <a:r>
-                        <a:rPr lang="en-US" sz="1600" dirty="0"/>
+                        <a:rPr lang="en-US" sz="1600"/>
                         <a:t>import / export </a:t>
                       </a:r>
                     </a:p>
@@ -9902,7 +9861,7 @@
                     <a:lstStyle/>
                     <a:p>
                       <a:r>
-                        <a:rPr lang="en-US" sz="1600" dirty="0"/>
+                        <a:rPr lang="en-US" sz="1600"/>
                         <a:t>Automatic</a:t>
                       </a:r>
                     </a:p>
@@ -9922,7 +9881,7 @@
                     <a:lstStyle/>
                     <a:p>
                       <a:r>
-                        <a:rPr lang="en-US" sz="1600" dirty="0"/>
+                        <a:rPr lang="en-US" sz="1600"/>
                         <a:t>async / await</a:t>
                       </a:r>
                     </a:p>
@@ -9935,7 +9894,7 @@
                     <a:lstStyle/>
                     <a:p>
                       <a:r>
-                        <a:rPr lang="en-US" sz="1600" dirty="0"/>
+                        <a:rPr lang="en-US" sz="1600"/>
                         <a:t>Implemented, unfortunately...</a:t>
                       </a:r>
                     </a:p>
@@ -9955,7 +9914,7 @@
                     <a:lstStyle/>
                     <a:p>
                       <a:r>
-                        <a:rPr lang="en-US" sz="1600" dirty="0"/>
+                        <a:rPr lang="en-US" sz="1600"/>
                         <a:t>type checking</a:t>
                       </a:r>
                     </a:p>
@@ -9968,7 +9927,7 @@
                     <a:lstStyle/>
                     <a:p>
                       <a:r>
-                        <a:rPr lang="en-US" sz="1600" dirty="0"/>
+                        <a:rPr lang="en-US" sz="1600"/>
                         <a:t>Build IDE type inferencing (not yet)</a:t>
                       </a:r>
                     </a:p>
@@ -10014,7 +9973,7 @@
           <a:lstStyle/>
           <a:p>
             <a:r>
-              <a:rPr lang="en-US" dirty="0"/>
+              <a:rPr lang="en-US"/>
               <a:t>ST implementation of JS/TS language features.</a:t>
             </a:r>
           </a:p>
@@ -10063,13 +10022,13 @@
           <a:lstStyle/>
           <a:p>
             <a:r>
-              <a:rPr lang="en-US" dirty="0"/>
+              <a:rPr lang="en-US"/>
               <a:t>The philosophy is that retaining simplicity </a:t>
             </a:r>
           </a:p>
           <a:p>
             <a:r>
-              <a:rPr lang="en-US" dirty="0"/>
+              <a:rPr lang="en-US"/>
               <a:t>is worth some extra lines of  encapsulated code.</a:t>
             </a:r>
           </a:p>
@@ -10129,7 +10088,7 @@
           <a:lstStyle/>
           <a:p>
             <a:r>
-              <a:rPr lang="en-US" dirty="0">
+              <a:rPr lang="en-US">
                 <a:solidFill>
                   <a:srgbClr val="0070C0"/>
                 </a:solidFill>
@@ -10137,21 +10096,21 @@
               <a:t>SmallJS vs traditional Smalltalks</a:t>
             </a:r>
             <a:br>
-              <a:rPr lang="en-US" dirty="0">
+              <a:rPr lang="en-US">
                 <a:solidFill>
                   <a:srgbClr val="0070C0"/>
                 </a:solidFill>
               </a:rPr>
             </a:br>
             <a:r>
-              <a:rPr lang="en-US" sz="2400" dirty="0">
+              <a:rPr lang="en-US" sz="2400">
                 <a:solidFill>
                   <a:srgbClr val="0070C0"/>
                 </a:solidFill>
               </a:rPr>
               <a:t>(E.g.: Pharo, Dolphin, Cincom, Squeak)</a:t>
             </a:r>
-            <a:endParaRPr lang="nl-NL" sz="2400" dirty="0">
+            <a:endParaRPr lang="nl-NL" sz="2400">
               <a:solidFill>
                 <a:srgbClr val="0070C0"/>
               </a:solidFill>
@@ -10188,61 +10147,61 @@
           <a:lstStyle/>
           <a:p>
             <a:r>
-              <a:rPr lang="en-US" sz="2400" dirty="0"/>
+              <a:rPr lang="en-US" sz="2400"/>
               <a:t>File-based (not image-based)</a:t>
             </a:r>
           </a:p>
           <a:p>
             <a:pPr lvl="1"/>
             <a:r>
-              <a:rPr lang="en-US" dirty="0"/>
+              <a:rPr lang="en-US"/>
               <a:t>Easy source control in clear hierarchy. IDE safely separate from code. Modular class loading iso unsafe image stripping. Can use rich and familiar IDE (VSCode).</a:t>
             </a:r>
           </a:p>
           <a:p>
             <a:r>
-              <a:rPr lang="en-US" sz="2400" dirty="0"/>
+              <a:rPr lang="en-US" sz="2400"/>
               <a:t>Run anywhere</a:t>
             </a:r>
           </a:p>
           <a:p>
             <a:pPr lvl="1"/>
             <a:r>
-              <a:rPr lang="en-US" dirty="0"/>
+              <a:rPr lang="en-US"/>
               <a:t>One language for front-end and back-end apps in all browsers and Node.js.</a:t>
             </a:r>
             <a:br>
-              <a:rPr lang="en-US" dirty="0"/>
+              <a:rPr lang="en-US"/>
             </a:br>
             <a:r>
-              <a:rPr lang="en-US" dirty="0"/>
+              <a:rPr lang="en-US"/>
               <a:t>So also runs on mobile devices.</a:t>
             </a:r>
           </a:p>
           <a:p>
             <a:r>
-              <a:rPr lang="en-US" sz="2400" dirty="0"/>
+              <a:rPr lang="en-US" sz="2400"/>
               <a:t>Integrates smoothly with the rich JS ecosystem</a:t>
             </a:r>
           </a:p>
           <a:p>
             <a:pPr lvl="1"/>
             <a:r>
-              <a:rPr lang="en-US" dirty="0"/>
+              <a:rPr lang="en-US"/>
               <a:t>Typically 1 line of interfacing code per encapsulated JS method.</a:t>
             </a:r>
           </a:p>
           <a:p>
             <a:pPr lvl="1"/>
             <a:r>
-              <a:rPr lang="en-US" dirty="0"/>
+              <a:rPr lang="en-US"/>
               <a:t>ST can call JS and vice versa.</a:t>
             </a:r>
           </a:p>
           <a:p>
             <a:pPr lvl="1"/>
             <a:r>
-              <a:rPr lang="en-US" dirty="0"/>
+              <a:rPr lang="en-US"/>
               <a:t>Newly available JS features and libraries can be integrated quickly.</a:t>
             </a:r>
           </a:p>
@@ -10305,14 +10264,14 @@
           <a:lstStyle/>
           <a:p>
             <a:r>
-              <a:rPr lang="en-US" dirty="0">
+              <a:rPr lang="en-US">
                 <a:solidFill>
                   <a:srgbClr val="0070C0"/>
                 </a:solidFill>
               </a:rPr>
               <a:t>SmallJS trade-offs</a:t>
             </a:r>
-            <a:endParaRPr lang="nl-NL" dirty="0">
+            <a:endParaRPr lang="nl-NL">
               <a:solidFill>
                 <a:srgbClr val="0070C0"/>
               </a:solidFill>
@@ -10347,7 +10306,7 @@
           <a:lstStyle/>
           <a:p>
             <a:r>
-              <a:rPr lang="en-US" sz="2400" dirty="0"/>
+              <a:rPr lang="en-US" sz="2400"/>
               <a:t>ST is dynamically typed</a:t>
             </a:r>
           </a:p>
@@ -10355,34 +10314,30 @@
             <a:pPr lvl="1"/>
             <a:r>
               <a:rPr lang="en-US" sz="2000"/>
-              <a:t>An </a:t>
-            </a:r>
-            <a:r>
-              <a:rPr lang="en-US" sz="2000" dirty="0"/>
-              <a:t>IDE enhancement cloud help here.</a:t>
+              <a:t>An IDE enhancement cloud help here.</a:t>
             </a:r>
           </a:p>
           <a:p>
             <a:pPr lvl="1"/>
             <a:r>
-              <a:rPr lang="en-US" sz="2000" dirty="0"/>
+              <a:rPr lang="en-US" sz="2000"/>
               <a:t>And optional typing like TS is an idea...</a:t>
             </a:r>
           </a:p>
           <a:p>
             <a:r>
-              <a:rPr lang="en-US" sz="2400" dirty="0"/>
+              <a:rPr lang="en-US" sz="2400"/>
               <a:t>No namespaces (yet)</a:t>
             </a:r>
           </a:p>
           <a:p>
             <a:r>
-              <a:rPr lang="en-US" sz="2400" dirty="0"/>
+              <a:rPr lang="en-US" sz="2400"/>
               <a:t>Tiny community</a:t>
             </a:r>
           </a:p>
           <a:p>
-            <a:endParaRPr lang="nl-NL" dirty="0"/>
+            <a:endParaRPr lang="nl-NL"/>
           </a:p>
         </p:txBody>
       </p:sp>

</xml_diff>

<commit_message>
Initial commit for website source, hosted on: small-js.org
</commit_message>
<xml_diff>
--- a/Documentation/Why_SmallJS.pptx
+++ b/Documentation/Why_SmallJS.pptx
@@ -207,7 +207,7 @@
           <a:p>
             <a:fld id="{7EE9B6BF-FCD1-4AFD-A293-49BDC34FBA2C}" type="datetimeFigureOut">
               <a:rPr lang="nl-NL" smtClean="0"/>
-              <a:t>29-2-2024</a:t>
+              <a:t>1-3-2024</a:t>
             </a:fld>
             <a:endParaRPr lang="nl-NL"/>
           </a:p>
@@ -2198,7 +2198,7 @@
           <a:p>
             <a:fld id="{4D9E9568-0F03-4866-87AD-CAF9FA4FA032}" type="datetimeFigureOut">
               <a:rPr lang="nl-NL" smtClean="0"/>
-              <a:t>29-2-2024</a:t>
+              <a:t>1-3-2024</a:t>
             </a:fld>
             <a:endParaRPr lang="nl-NL"/>
           </a:p>
@@ -2449,7 +2449,7 @@
           <a:p>
             <a:fld id="{4D9E9568-0F03-4866-87AD-CAF9FA4FA032}" type="datetimeFigureOut">
               <a:rPr lang="nl-NL" smtClean="0"/>
-              <a:t>29-2-2024</a:t>
+              <a:t>1-3-2024</a:t>
             </a:fld>
             <a:endParaRPr lang="nl-NL"/>
           </a:p>
@@ -2763,7 +2763,7 @@
           <a:p>
             <a:fld id="{4D9E9568-0F03-4866-87AD-CAF9FA4FA032}" type="datetimeFigureOut">
               <a:rPr lang="nl-NL" smtClean="0"/>
-              <a:t>29-2-2024</a:t>
+              <a:t>1-3-2024</a:t>
             </a:fld>
             <a:endParaRPr lang="nl-NL"/>
           </a:p>
@@ -3096,7 +3096,7 @@
           <a:p>
             <a:fld id="{4D9E9568-0F03-4866-87AD-CAF9FA4FA032}" type="datetimeFigureOut">
               <a:rPr lang="nl-NL" smtClean="0"/>
-              <a:t>29-2-2024</a:t>
+              <a:t>1-3-2024</a:t>
             </a:fld>
             <a:endParaRPr lang="nl-NL"/>
           </a:p>
@@ -3410,7 +3410,7 @@
           <a:p>
             <a:fld id="{4D9E9568-0F03-4866-87AD-CAF9FA4FA032}" type="datetimeFigureOut">
               <a:rPr lang="nl-NL" smtClean="0"/>
-              <a:t>29-2-2024</a:t>
+              <a:t>1-3-2024</a:t>
             </a:fld>
             <a:endParaRPr lang="nl-NL"/>
           </a:p>
@@ -3803,7 +3803,7 @@
           <a:p>
             <a:fld id="{4D9E9568-0F03-4866-87AD-CAF9FA4FA032}" type="datetimeFigureOut">
               <a:rPr lang="nl-NL" smtClean="0"/>
-              <a:t>29-2-2024</a:t>
+              <a:t>1-3-2024</a:t>
             </a:fld>
             <a:endParaRPr lang="nl-NL"/>
           </a:p>
@@ -3973,7 +3973,7 @@
           <a:p>
             <a:fld id="{4D9E9568-0F03-4866-87AD-CAF9FA4FA032}" type="datetimeFigureOut">
               <a:rPr lang="nl-NL" smtClean="0"/>
-              <a:t>29-2-2024</a:t>
+              <a:t>1-3-2024</a:t>
             </a:fld>
             <a:endParaRPr lang="nl-NL"/>
           </a:p>
@@ -4153,7 +4153,7 @@
           <a:p>
             <a:fld id="{4D9E9568-0F03-4866-87AD-CAF9FA4FA032}" type="datetimeFigureOut">
               <a:rPr lang="nl-NL" smtClean="0"/>
-              <a:t>29-2-2024</a:t>
+              <a:t>1-3-2024</a:t>
             </a:fld>
             <a:endParaRPr lang="nl-NL"/>
           </a:p>
@@ -4323,7 +4323,7 @@
           <a:p>
             <a:fld id="{4D9E9568-0F03-4866-87AD-CAF9FA4FA032}" type="datetimeFigureOut">
               <a:rPr lang="nl-NL" smtClean="0"/>
-              <a:t>29-2-2024</a:t>
+              <a:t>1-3-2024</a:t>
             </a:fld>
             <a:endParaRPr lang="nl-NL"/>
           </a:p>
@@ -4570,7 +4570,7 @@
           <a:p>
             <a:fld id="{4D9E9568-0F03-4866-87AD-CAF9FA4FA032}" type="datetimeFigureOut">
               <a:rPr lang="nl-NL" smtClean="0"/>
-              <a:t>29-2-2024</a:t>
+              <a:t>1-3-2024</a:t>
             </a:fld>
             <a:endParaRPr lang="nl-NL"/>
           </a:p>
@@ -4802,7 +4802,7 @@
           <a:p>
             <a:fld id="{4D9E9568-0F03-4866-87AD-CAF9FA4FA032}" type="datetimeFigureOut">
               <a:rPr lang="nl-NL" smtClean="0"/>
-              <a:t>29-2-2024</a:t>
+              <a:t>1-3-2024</a:t>
             </a:fld>
             <a:endParaRPr lang="nl-NL"/>
           </a:p>
@@ -5176,7 +5176,7 @@
           <a:p>
             <a:fld id="{4D9E9568-0F03-4866-87AD-CAF9FA4FA032}" type="datetimeFigureOut">
               <a:rPr lang="nl-NL" smtClean="0"/>
-              <a:t>29-2-2024</a:t>
+              <a:t>1-3-2024</a:t>
             </a:fld>
             <a:endParaRPr lang="nl-NL"/>
           </a:p>
@@ -5299,7 +5299,7 @@
           <a:p>
             <a:fld id="{4D9E9568-0F03-4866-87AD-CAF9FA4FA032}" type="datetimeFigureOut">
               <a:rPr lang="nl-NL" smtClean="0"/>
-              <a:t>29-2-2024</a:t>
+              <a:t>1-3-2024</a:t>
             </a:fld>
             <a:endParaRPr lang="nl-NL"/>
           </a:p>
@@ -5394,7 +5394,7 @@
           <a:p>
             <a:fld id="{4D9E9568-0F03-4866-87AD-CAF9FA4FA032}" type="datetimeFigureOut">
               <a:rPr lang="nl-NL" smtClean="0"/>
-              <a:t>29-2-2024</a:t>
+              <a:t>1-3-2024</a:t>
             </a:fld>
             <a:endParaRPr lang="nl-NL"/>
           </a:p>
@@ -5649,7 +5649,7 @@
           <a:p>
             <a:fld id="{4D9E9568-0F03-4866-87AD-CAF9FA4FA032}" type="datetimeFigureOut">
               <a:rPr lang="nl-NL" smtClean="0"/>
-              <a:t>29-2-2024</a:t>
+              <a:t>1-3-2024</a:t>
             </a:fld>
             <a:endParaRPr lang="nl-NL"/>
           </a:p>
@@ -5953,7 +5953,7 @@
           <a:p>
             <a:fld id="{4D9E9568-0F03-4866-87AD-CAF9FA4FA032}" type="datetimeFigureOut">
               <a:rPr lang="nl-NL" smtClean="0"/>
-              <a:t>29-2-2024</a:t>
+              <a:t>1-3-2024</a:t>
             </a:fld>
             <a:endParaRPr lang="nl-NL"/>
           </a:p>
@@ -6655,7 +6655,7 @@
           <a:p>
             <a:fld id="{4D9E9568-0F03-4866-87AD-CAF9FA4FA032}" type="datetimeFigureOut">
               <a:rPr lang="nl-NL" smtClean="0"/>
-              <a:t>29-2-2024</a:t>
+              <a:t>1-3-2024</a:t>
             </a:fld>
             <a:endParaRPr lang="nl-NL"/>
           </a:p>
@@ -7338,6 +7338,36 @@
           </a:p>
         </p:txBody>
       </p:sp>
+      <p:pic>
+        <p:nvPicPr>
+          <p:cNvPr id="5" name="Picture 4">
+            <a:extLst>
+              <a:ext uri="{FF2B5EF4-FFF2-40B4-BE49-F238E27FC236}">
+                <a16:creationId xmlns:a16="http://schemas.microsoft.com/office/drawing/2014/main" id="{00A9558E-15AF-DD4C-6AA2-555E702E8830}"/>
+              </a:ext>
+            </a:extLst>
+          </p:cNvPr>
+          <p:cNvPicPr>
+            <a:picLocks noChangeAspect="1"/>
+          </p:cNvPicPr>
+          <p:nvPr/>
+        </p:nvPicPr>
+        <p:blipFill>
+          <a:blip r:embed="rId4"/>
+          <a:stretch>
+            <a:fillRect/>
+          </a:stretch>
+        </p:blipFill>
+        <p:spPr>
+          <a:xfrm>
+            <a:off x="9642668" y="3429000"/>
+            <a:ext cx="2549331" cy="3429000"/>
+          </a:xfrm>
+          <a:prstGeom prst="rect">
+            <a:avLst/>
+          </a:prstGeom>
+        </p:spPr>
+      </p:pic>
     </p:spTree>
     <p:extLst>
       <p:ext uri="{BB962C8B-B14F-4D97-AF65-F5344CB8AC3E}">

</xml_diff>

<commit_message>
Documentation: Small presentation update
</commit_message>
<xml_diff>
--- a/Documentation/Why_SmallJS.pptx
+++ b/Documentation/Why_SmallJS.pptx
@@ -207,7 +207,7 @@
           <a:p>
             <a:fld id="{7EE9B6BF-FCD1-4AFD-A293-49BDC34FBA2C}" type="datetimeFigureOut">
               <a:rPr lang="nl-NL" smtClean="0"/>
-              <a:t>1-3-2024</a:t>
+              <a:t>11-7-2024</a:t>
             </a:fld>
             <a:endParaRPr lang="nl-NL"/>
           </a:p>
@@ -2198,7 +2198,7 @@
           <a:p>
             <a:fld id="{4D9E9568-0F03-4866-87AD-CAF9FA4FA032}" type="datetimeFigureOut">
               <a:rPr lang="nl-NL" smtClean="0"/>
-              <a:t>1-3-2024</a:t>
+              <a:t>11-7-2024</a:t>
             </a:fld>
             <a:endParaRPr lang="nl-NL"/>
           </a:p>
@@ -2449,7 +2449,7 @@
           <a:p>
             <a:fld id="{4D9E9568-0F03-4866-87AD-CAF9FA4FA032}" type="datetimeFigureOut">
               <a:rPr lang="nl-NL" smtClean="0"/>
-              <a:t>1-3-2024</a:t>
+              <a:t>11-7-2024</a:t>
             </a:fld>
             <a:endParaRPr lang="nl-NL"/>
           </a:p>
@@ -2763,7 +2763,7 @@
           <a:p>
             <a:fld id="{4D9E9568-0F03-4866-87AD-CAF9FA4FA032}" type="datetimeFigureOut">
               <a:rPr lang="nl-NL" smtClean="0"/>
-              <a:t>1-3-2024</a:t>
+              <a:t>11-7-2024</a:t>
             </a:fld>
             <a:endParaRPr lang="nl-NL"/>
           </a:p>
@@ -3096,7 +3096,7 @@
           <a:p>
             <a:fld id="{4D9E9568-0F03-4866-87AD-CAF9FA4FA032}" type="datetimeFigureOut">
               <a:rPr lang="nl-NL" smtClean="0"/>
-              <a:t>1-3-2024</a:t>
+              <a:t>11-7-2024</a:t>
             </a:fld>
             <a:endParaRPr lang="nl-NL"/>
           </a:p>
@@ -3410,7 +3410,7 @@
           <a:p>
             <a:fld id="{4D9E9568-0F03-4866-87AD-CAF9FA4FA032}" type="datetimeFigureOut">
               <a:rPr lang="nl-NL" smtClean="0"/>
-              <a:t>1-3-2024</a:t>
+              <a:t>11-7-2024</a:t>
             </a:fld>
             <a:endParaRPr lang="nl-NL"/>
           </a:p>
@@ -3803,7 +3803,7 @@
           <a:p>
             <a:fld id="{4D9E9568-0F03-4866-87AD-CAF9FA4FA032}" type="datetimeFigureOut">
               <a:rPr lang="nl-NL" smtClean="0"/>
-              <a:t>1-3-2024</a:t>
+              <a:t>11-7-2024</a:t>
             </a:fld>
             <a:endParaRPr lang="nl-NL"/>
           </a:p>
@@ -3973,7 +3973,7 @@
           <a:p>
             <a:fld id="{4D9E9568-0F03-4866-87AD-CAF9FA4FA032}" type="datetimeFigureOut">
               <a:rPr lang="nl-NL" smtClean="0"/>
-              <a:t>1-3-2024</a:t>
+              <a:t>11-7-2024</a:t>
             </a:fld>
             <a:endParaRPr lang="nl-NL"/>
           </a:p>
@@ -4153,7 +4153,7 @@
           <a:p>
             <a:fld id="{4D9E9568-0F03-4866-87AD-CAF9FA4FA032}" type="datetimeFigureOut">
               <a:rPr lang="nl-NL" smtClean="0"/>
-              <a:t>1-3-2024</a:t>
+              <a:t>11-7-2024</a:t>
             </a:fld>
             <a:endParaRPr lang="nl-NL"/>
           </a:p>
@@ -4323,7 +4323,7 @@
           <a:p>
             <a:fld id="{4D9E9568-0F03-4866-87AD-CAF9FA4FA032}" type="datetimeFigureOut">
               <a:rPr lang="nl-NL" smtClean="0"/>
-              <a:t>1-3-2024</a:t>
+              <a:t>11-7-2024</a:t>
             </a:fld>
             <a:endParaRPr lang="nl-NL"/>
           </a:p>
@@ -4570,7 +4570,7 @@
           <a:p>
             <a:fld id="{4D9E9568-0F03-4866-87AD-CAF9FA4FA032}" type="datetimeFigureOut">
               <a:rPr lang="nl-NL" smtClean="0"/>
-              <a:t>1-3-2024</a:t>
+              <a:t>11-7-2024</a:t>
             </a:fld>
             <a:endParaRPr lang="nl-NL"/>
           </a:p>
@@ -4802,7 +4802,7 @@
           <a:p>
             <a:fld id="{4D9E9568-0F03-4866-87AD-CAF9FA4FA032}" type="datetimeFigureOut">
               <a:rPr lang="nl-NL" smtClean="0"/>
-              <a:t>1-3-2024</a:t>
+              <a:t>11-7-2024</a:t>
             </a:fld>
             <a:endParaRPr lang="nl-NL"/>
           </a:p>
@@ -5176,7 +5176,7 @@
           <a:p>
             <a:fld id="{4D9E9568-0F03-4866-87AD-CAF9FA4FA032}" type="datetimeFigureOut">
               <a:rPr lang="nl-NL" smtClean="0"/>
-              <a:t>1-3-2024</a:t>
+              <a:t>11-7-2024</a:t>
             </a:fld>
             <a:endParaRPr lang="nl-NL"/>
           </a:p>
@@ -5299,7 +5299,7 @@
           <a:p>
             <a:fld id="{4D9E9568-0F03-4866-87AD-CAF9FA4FA032}" type="datetimeFigureOut">
               <a:rPr lang="nl-NL" smtClean="0"/>
-              <a:t>1-3-2024</a:t>
+              <a:t>11-7-2024</a:t>
             </a:fld>
             <a:endParaRPr lang="nl-NL"/>
           </a:p>
@@ -5394,7 +5394,7 @@
           <a:p>
             <a:fld id="{4D9E9568-0F03-4866-87AD-CAF9FA4FA032}" type="datetimeFigureOut">
               <a:rPr lang="nl-NL" smtClean="0"/>
-              <a:t>1-3-2024</a:t>
+              <a:t>11-7-2024</a:t>
             </a:fld>
             <a:endParaRPr lang="nl-NL"/>
           </a:p>
@@ -5649,7 +5649,7 @@
           <a:p>
             <a:fld id="{4D9E9568-0F03-4866-87AD-CAF9FA4FA032}" type="datetimeFigureOut">
               <a:rPr lang="nl-NL" smtClean="0"/>
-              <a:t>1-3-2024</a:t>
+              <a:t>11-7-2024</a:t>
             </a:fld>
             <a:endParaRPr lang="nl-NL"/>
           </a:p>
@@ -5953,7 +5953,7 @@
           <a:p>
             <a:fld id="{4D9E9568-0F03-4866-87AD-CAF9FA4FA032}" type="datetimeFigureOut">
               <a:rPr lang="nl-NL" smtClean="0"/>
-              <a:t>1-3-2024</a:t>
+              <a:t>11-7-2024</a:t>
             </a:fld>
             <a:endParaRPr lang="nl-NL"/>
           </a:p>
@@ -6655,7 +6655,7 @@
           <a:p>
             <a:fld id="{4D9E9568-0F03-4866-87AD-CAF9FA4FA032}" type="datetimeFigureOut">
               <a:rPr lang="nl-NL" smtClean="0"/>
-              <a:t>1-3-2024</a:t>
+              <a:t>11-7-2024</a:t>
             </a:fld>
             <a:endParaRPr lang="nl-NL"/>
           </a:p>
@@ -7333,7 +7333,15 @@
           <a:p>
             <a:r>
               <a:rPr lang="nl-NL"/>
-              <a:t>Open sourced on: github.com/Small-JS/SmallJS</a:t>
+              <a:t>Website:  </a:t>
+            </a:r>
+            <a:r>
+              <a:rPr lang="nl-NL">
+                <a:solidFill>
+                  <a:srgbClr val="0070C0"/>
+                </a:solidFill>
+              </a:rPr>
+              <a:t>small-js.org</a:t>
             </a:r>
           </a:p>
         </p:txBody>
@@ -7668,7 +7676,15 @@
             <a:pPr algn="ctr"/>
             <a:r>
               <a:rPr lang="nl-NL" sz="2400"/>
-              <a:t>github.com/Small-JS/SmallJS</a:t>
+              <a:t>Website: </a:t>
+            </a:r>
+            <a:r>
+              <a:rPr lang="nl-NL" sz="2400">
+                <a:solidFill>
+                  <a:srgbClr val="0070C0"/>
+                </a:solidFill>
+              </a:rPr>
+              <a:t> small-js.org</a:t>
             </a:r>
           </a:p>
         </p:txBody>

</xml_diff>